<commit_message>
Arrange docs folder + add ARD
</commit_message>
<xml_diff>
--- a/Docs/ProjectGantt.pptx
+++ b/Docs/ProjectGantt.pptx
@@ -206,7 +206,7 @@
           <a:p>
             <a:fld id="{75E34E56-B615-49A0-8EF1-E9F65D11ACC1}" type="datetimeFigureOut">
               <a:rPr lang="he-IL" smtClean="0"/>
-              <a:t>י"ט/ניסן/תשפ"ג</a:t>
+              <a:t>ח'/אייר/תשפ"ג</a:t>
             </a:fld>
             <a:endParaRPr lang="he-IL"/>
           </a:p>
@@ -1532,7 +1532,7 @@
           <a:p>
             <a:fld id="{62679F71-E552-4891-A71A-015ADD22FDD3}" type="datetimeFigureOut">
               <a:rPr lang="he-IL" smtClean="0"/>
-              <a:t>י"ט/ניסן/תשפ"ג</a:t>
+              <a:t>ח'/אייר/תשפ"ג</a:t>
             </a:fld>
             <a:endParaRPr lang="he-IL"/>
           </a:p>
@@ -1783,7 +1783,7 @@
           <a:p>
             <a:fld id="{62679F71-E552-4891-A71A-015ADD22FDD3}" type="datetimeFigureOut">
               <a:rPr lang="he-IL" smtClean="0"/>
-              <a:t>י"ט/ניסן/תשפ"ג</a:t>
+              <a:t>ח'/אייר/תשפ"ג</a:t>
             </a:fld>
             <a:endParaRPr lang="he-IL"/>
           </a:p>
@@ -2097,7 +2097,7 @@
           <a:p>
             <a:fld id="{62679F71-E552-4891-A71A-015ADD22FDD3}" type="datetimeFigureOut">
               <a:rPr lang="he-IL" smtClean="0"/>
-              <a:t>י"ט/ניסן/תשפ"ג</a:t>
+              <a:t>ח'/אייר/תשפ"ג</a:t>
             </a:fld>
             <a:endParaRPr lang="he-IL"/>
           </a:p>
@@ -2438,7 +2438,7 @@
           <a:p>
             <a:fld id="{62679F71-E552-4891-A71A-015ADD22FDD3}" type="datetimeFigureOut">
               <a:rPr lang="he-IL" smtClean="0"/>
-              <a:t>י"ט/ניסן/תשפ"ג</a:t>
+              <a:t>ח'/אייר/תשפ"ג</a:t>
             </a:fld>
             <a:endParaRPr lang="he-IL"/>
           </a:p>
@@ -2752,7 +2752,7 @@
           <a:p>
             <a:fld id="{62679F71-E552-4891-A71A-015ADD22FDD3}" type="datetimeFigureOut">
               <a:rPr lang="he-IL" smtClean="0"/>
-              <a:t>י"ט/ניסן/תשפ"ג</a:t>
+              <a:t>ח'/אייר/תשפ"ג</a:t>
             </a:fld>
             <a:endParaRPr lang="he-IL"/>
           </a:p>
@@ -3145,7 +3145,7 @@
           <a:p>
             <a:fld id="{62679F71-E552-4891-A71A-015ADD22FDD3}" type="datetimeFigureOut">
               <a:rPr lang="he-IL" smtClean="0"/>
-              <a:t>י"ט/ניסן/תשפ"ג</a:t>
+              <a:t>ח'/אייר/תשפ"ג</a:t>
             </a:fld>
             <a:endParaRPr lang="he-IL"/>
           </a:p>
@@ -3315,7 +3315,7 @@
           <a:p>
             <a:fld id="{62679F71-E552-4891-A71A-015ADD22FDD3}" type="datetimeFigureOut">
               <a:rPr lang="he-IL" smtClean="0"/>
-              <a:t>י"ט/ניסן/תשפ"ג</a:t>
+              <a:t>ח'/אייר/תשפ"ג</a:t>
             </a:fld>
             <a:endParaRPr lang="he-IL"/>
           </a:p>
@@ -3495,7 +3495,7 @@
           <a:p>
             <a:fld id="{62679F71-E552-4891-A71A-015ADD22FDD3}" type="datetimeFigureOut">
               <a:rPr lang="he-IL" smtClean="0"/>
-              <a:t>י"ט/ניסן/תשפ"ג</a:t>
+              <a:t>ח'/אייר/תשפ"ג</a:t>
             </a:fld>
             <a:endParaRPr lang="he-IL"/>
           </a:p>
@@ -3671,7 +3671,7 @@
           <a:p>
             <a:fld id="{62679F71-E552-4891-A71A-015ADD22FDD3}" type="datetimeFigureOut">
               <a:rPr lang="he-IL" smtClean="0"/>
-              <a:t>י"ט/ניסן/תשפ"ג</a:t>
+              <a:t>ח'/אייר/תשפ"ג</a:t>
             </a:fld>
             <a:endParaRPr lang="he-IL"/>
           </a:p>
@@ -3918,7 +3918,7 @@
           <a:p>
             <a:fld id="{62679F71-E552-4891-A71A-015ADD22FDD3}" type="datetimeFigureOut">
               <a:rPr lang="he-IL" smtClean="0"/>
-              <a:t>י"ט/ניסן/תשפ"ג</a:t>
+              <a:t>ח'/אייר/תשפ"ג</a:t>
             </a:fld>
             <a:endParaRPr lang="he-IL"/>
           </a:p>
@@ -4150,7 +4150,7 @@
           <a:p>
             <a:fld id="{62679F71-E552-4891-A71A-015ADD22FDD3}" type="datetimeFigureOut">
               <a:rPr lang="he-IL" smtClean="0"/>
-              <a:t>י"ט/ניסן/תשפ"ג</a:t>
+              <a:t>ח'/אייר/תשפ"ג</a:t>
             </a:fld>
             <a:endParaRPr lang="he-IL"/>
           </a:p>
@@ -4524,7 +4524,7 @@
           <a:p>
             <a:fld id="{62679F71-E552-4891-A71A-015ADD22FDD3}" type="datetimeFigureOut">
               <a:rPr lang="he-IL" smtClean="0"/>
-              <a:t>י"ט/ניסן/תשפ"ג</a:t>
+              <a:t>ח'/אייר/תשפ"ג</a:t>
             </a:fld>
             <a:endParaRPr lang="he-IL"/>
           </a:p>
@@ -4647,7 +4647,7 @@
           <a:p>
             <a:fld id="{62679F71-E552-4891-A71A-015ADD22FDD3}" type="datetimeFigureOut">
               <a:rPr lang="he-IL" smtClean="0"/>
-              <a:t>י"ט/ניסן/תשפ"ג</a:t>
+              <a:t>ח'/אייר/תשפ"ג</a:t>
             </a:fld>
             <a:endParaRPr lang="he-IL"/>
           </a:p>
@@ -4742,7 +4742,7 @@
           <a:p>
             <a:fld id="{62679F71-E552-4891-A71A-015ADD22FDD3}" type="datetimeFigureOut">
               <a:rPr lang="he-IL" smtClean="0"/>
-              <a:t>י"ט/ניסן/תשפ"ג</a:t>
+              <a:t>ח'/אייר/תשפ"ג</a:t>
             </a:fld>
             <a:endParaRPr lang="he-IL"/>
           </a:p>
@@ -4997,7 +4997,7 @@
           <a:p>
             <a:fld id="{62679F71-E552-4891-A71A-015ADD22FDD3}" type="datetimeFigureOut">
               <a:rPr lang="he-IL" smtClean="0"/>
-              <a:t>י"ט/ניסן/תשפ"ג</a:t>
+              <a:t>ח'/אייר/תשפ"ג</a:t>
             </a:fld>
             <a:endParaRPr lang="he-IL"/>
           </a:p>
@@ -5260,7 +5260,7 @@
           <a:p>
             <a:fld id="{62679F71-E552-4891-A71A-015ADD22FDD3}" type="datetimeFigureOut">
               <a:rPr lang="he-IL" smtClean="0"/>
-              <a:t>י"ט/ניסן/תשפ"ג</a:t>
+              <a:t>ח'/אייר/תשפ"ג</a:t>
             </a:fld>
             <a:endParaRPr lang="he-IL"/>
           </a:p>
@@ -6003,7 +6003,7 @@
           <a:p>
             <a:fld id="{62679F71-E552-4891-A71A-015ADD22FDD3}" type="datetimeFigureOut">
               <a:rPr lang="he-IL" smtClean="0"/>
-              <a:t>י"ט/ניסן/תשפ"ג</a:t>
+              <a:t>ח'/אייר/תשפ"ג</a:t>
             </a:fld>
             <a:endParaRPr lang="he-IL"/>
           </a:p>
@@ -15304,7 +15304,7 @@
           <p:nvPr>
             <p:extLst>
               <p:ext uri="{D42A27DB-BD31-4B8C-83A1-F6EECF244321}">
-                <p14:modId xmlns:p14="http://schemas.microsoft.com/office/powerpoint/2010/main" val="1690527499"/>
+                <p14:modId xmlns:p14="http://schemas.microsoft.com/office/powerpoint/2010/main" val="284853062"/>
               </p:ext>
             </p:extLst>
           </p:nvPr>
@@ -17846,14 +17846,6 @@
                         <a:tabLst/>
                         <a:defRPr/>
                       </a:pPr>
-                      <a:r>
-                        <a:rPr lang="en-US" sz="1400" dirty="0"/>
-                        <a:t>Team</a:t>
-                      </a:r>
-                      <a:r>
-                        <a:rPr lang="en-US" sz="1400" baseline="0" dirty="0"/>
-                        <a:t> (TBA)</a:t>
-                      </a:r>
                       <a:endParaRPr lang="he-IL" sz="1400" dirty="0"/>
                     </a:p>
                   </a:txBody>
@@ -17907,7 +17899,27 @@
                     <a:bodyPr/>
                     <a:lstStyle/>
                     <a:p>
-                      <a:pPr algn="ctr" rtl="0"/>
+                      <a:pPr marL="0" marR="0" lvl="0" indent="0" algn="ctr" defTabSz="457200" rtl="0" eaLnBrk="1" fontAlgn="auto" latinLnBrk="0" hangingPunct="1">
+                        <a:lnSpc>
+                          <a:spcPct val="100000"/>
+                        </a:lnSpc>
+                        <a:spcBef>
+                          <a:spcPts val="0"/>
+                        </a:spcBef>
+                        <a:spcAft>
+                          <a:spcPts val="0"/>
+                        </a:spcAft>
+                        <a:buClrTx/>
+                        <a:buSzTx/>
+                        <a:buFontTx/>
+                        <a:buNone/>
+                        <a:tabLst/>
+                        <a:defRPr/>
+                      </a:pPr>
+                      <a:r>
+                        <a:rPr lang="en-US" sz="1400" dirty="0"/>
+                        <a:t>Team</a:t>
+                      </a:r>
                       <a:endParaRPr lang="he-IL" sz="1400" dirty="0"/>
                     </a:p>
                   </a:txBody>
@@ -17949,7 +17961,7 @@
                       <a:prstDash val="solid"/>
                     </a:lnBlToTr>
                     <a:solidFill>
-                      <a:schemeClr val="accent3">
+                      <a:schemeClr val="accent1">
                         <a:lumMod val="40000"/>
                         <a:lumOff val="60000"/>
                       </a:schemeClr>

</xml_diff>